<commit_message>
Aggiornamento slide sulla sezione matrici
</commit_message>
<xml_diff>
--- a/Presentazione.pptx
+++ b/Presentazione.pptx
@@ -5,7 +5,7 @@
     <p:sldMasterId id="2147483648" r:id="rId1"/>
   </p:sldMasterIdLst>
   <p:notesMasterIdLst>
-    <p:notesMasterId r:id="rId15"/>
+    <p:notesMasterId r:id="rId16"/>
   </p:notesMasterIdLst>
   <p:sldIdLst>
     <p:sldId id="256" r:id="rId2"/>
@@ -17,10 +17,11 @@
     <p:sldId id="260" r:id="rId8"/>
     <p:sldId id="264" r:id="rId9"/>
     <p:sldId id="265" r:id="rId10"/>
-    <p:sldId id="266" r:id="rId11"/>
-    <p:sldId id="267" r:id="rId12"/>
-    <p:sldId id="263" r:id="rId13"/>
-    <p:sldId id="262" r:id="rId14"/>
+    <p:sldId id="272" r:id="rId11"/>
+    <p:sldId id="266" r:id="rId12"/>
+    <p:sldId id="267" r:id="rId13"/>
+    <p:sldId id="263" r:id="rId14"/>
+    <p:sldId id="262" r:id="rId15"/>
   </p:sldIdLst>
   <p:sldSz cx="12192000" cy="6858000"/>
   <p:notesSz cx="6858000" cy="9144000"/>
@@ -625,7 +626,7 @@
           <a:p>
             <a:fld id="{F0BCF025-A966-45CF-903B-391187988970}" type="slidenum">
               <a:rPr lang="it-IT" smtClean="0"/>
-              <a:t>13</a:t>
+              <a:t>14</a:t>
             </a:fld>
             <a:endParaRPr lang="it-IT"/>
           </a:p>
@@ -4222,221 +4223,6 @@
           </a:p>
         </p:txBody>
       </p:sp>
-      <p:sp>
-        <p:nvSpPr>
-          <p:cNvPr id="4" name="Segnaposto contenuto 2">
-            <a:extLst>
-              <a:ext uri="{FF2B5EF4-FFF2-40B4-BE49-F238E27FC236}">
-                <a16:creationId xmlns:a16="http://schemas.microsoft.com/office/drawing/2014/main" id="{91689680-E88A-4CA0-9C49-3684A0AB466F}"/>
-              </a:ext>
-            </a:extLst>
-          </p:cNvPr>
-          <p:cNvSpPr txBox="1">
-            <a:spLocks noGrp="1"/>
-          </p:cNvSpPr>
-          <p:nvPr>
-            <p:ph idx="1"/>
-          </p:nvPr>
-        </p:nvSpPr>
-        <p:spPr>
-          <a:xfrm>
-            <a:off x="481739" y="1884443"/>
-            <a:ext cx="5257800" cy="902077"/>
-          </a:xfrm>
-          <a:prstGeom prst="rect">
-            <a:avLst/>
-          </a:prstGeom>
-        </p:spPr>
-        <p:txBody>
-          <a:bodyPr vert="horz" lIns="91440" tIns="45720" rIns="91440" bIns="45720" rtlCol="0">
-            <a:normAutofit fontScale="92500" lnSpcReduction="10000"/>
-          </a:bodyPr>
-          <a:lstStyle>
-            <a:lvl1pPr marL="228600" indent="-228600" algn="l" defTabSz="914400" rtl="0" eaLnBrk="1" latinLnBrk="0" hangingPunct="1">
-              <a:lnSpc>
-                <a:spcPct val="90000"/>
-              </a:lnSpc>
-              <a:spcBef>
-                <a:spcPts val="1000"/>
-              </a:spcBef>
-              <a:buFont typeface="Arial" panose="020B0604020202020204" pitchFamily="34" charset="0"/>
-              <a:buChar char="•"/>
-              <a:defRPr sz="2800" kern="1200">
-                <a:solidFill>
-                  <a:schemeClr val="tx1"/>
-                </a:solidFill>
-                <a:latin typeface="+mn-lt"/>
-                <a:ea typeface="+mn-ea"/>
-                <a:cs typeface="+mn-cs"/>
-              </a:defRPr>
-            </a:lvl1pPr>
-            <a:lvl2pPr marL="685800" indent="-228600" algn="l" defTabSz="914400" rtl="0" eaLnBrk="1" latinLnBrk="0" hangingPunct="1">
-              <a:lnSpc>
-                <a:spcPct val="90000"/>
-              </a:lnSpc>
-              <a:spcBef>
-                <a:spcPts val="500"/>
-              </a:spcBef>
-              <a:buFont typeface="Arial" panose="020B0604020202020204" pitchFamily="34" charset="0"/>
-              <a:buChar char="•"/>
-              <a:defRPr sz="2400" kern="1200">
-                <a:solidFill>
-                  <a:schemeClr val="tx1"/>
-                </a:solidFill>
-                <a:latin typeface="+mn-lt"/>
-                <a:ea typeface="+mn-ea"/>
-                <a:cs typeface="+mn-cs"/>
-              </a:defRPr>
-            </a:lvl2pPr>
-            <a:lvl3pPr marL="1143000" indent="-228600" algn="l" defTabSz="914400" rtl="0" eaLnBrk="1" latinLnBrk="0" hangingPunct="1">
-              <a:lnSpc>
-                <a:spcPct val="90000"/>
-              </a:lnSpc>
-              <a:spcBef>
-                <a:spcPts val="500"/>
-              </a:spcBef>
-              <a:buFont typeface="Arial" panose="020B0604020202020204" pitchFamily="34" charset="0"/>
-              <a:buChar char="•"/>
-              <a:defRPr sz="2000" kern="1200">
-                <a:solidFill>
-                  <a:schemeClr val="tx1"/>
-                </a:solidFill>
-                <a:latin typeface="+mn-lt"/>
-                <a:ea typeface="+mn-ea"/>
-                <a:cs typeface="+mn-cs"/>
-              </a:defRPr>
-            </a:lvl3pPr>
-            <a:lvl4pPr marL="1600200" indent="-228600" algn="l" defTabSz="914400" rtl="0" eaLnBrk="1" latinLnBrk="0" hangingPunct="1">
-              <a:lnSpc>
-                <a:spcPct val="90000"/>
-              </a:lnSpc>
-              <a:spcBef>
-                <a:spcPts val="500"/>
-              </a:spcBef>
-              <a:buFont typeface="Arial" panose="020B0604020202020204" pitchFamily="34" charset="0"/>
-              <a:buChar char="•"/>
-              <a:defRPr sz="1800" kern="1200">
-                <a:solidFill>
-                  <a:schemeClr val="tx1"/>
-                </a:solidFill>
-                <a:latin typeface="+mn-lt"/>
-                <a:ea typeface="+mn-ea"/>
-                <a:cs typeface="+mn-cs"/>
-              </a:defRPr>
-            </a:lvl4pPr>
-            <a:lvl5pPr marL="2057400" indent="-228600" algn="l" defTabSz="914400" rtl="0" eaLnBrk="1" latinLnBrk="0" hangingPunct="1">
-              <a:lnSpc>
-                <a:spcPct val="90000"/>
-              </a:lnSpc>
-              <a:spcBef>
-                <a:spcPts val="500"/>
-              </a:spcBef>
-              <a:buFont typeface="Arial" panose="020B0604020202020204" pitchFamily="34" charset="0"/>
-              <a:buChar char="•"/>
-              <a:defRPr sz="1800" kern="1200">
-                <a:solidFill>
-                  <a:schemeClr val="tx1"/>
-                </a:solidFill>
-                <a:latin typeface="+mn-lt"/>
-                <a:ea typeface="+mn-ea"/>
-                <a:cs typeface="+mn-cs"/>
-              </a:defRPr>
-            </a:lvl5pPr>
-            <a:lvl6pPr marL="2514600" indent="-228600" algn="l" defTabSz="914400" rtl="0" eaLnBrk="1" latinLnBrk="0" hangingPunct="1">
-              <a:lnSpc>
-                <a:spcPct val="90000"/>
-              </a:lnSpc>
-              <a:spcBef>
-                <a:spcPts val="500"/>
-              </a:spcBef>
-              <a:buFont typeface="Arial" panose="020B0604020202020204" pitchFamily="34" charset="0"/>
-              <a:buChar char="•"/>
-              <a:defRPr sz="1800" kern="1200">
-                <a:solidFill>
-                  <a:schemeClr val="tx1"/>
-                </a:solidFill>
-                <a:latin typeface="+mn-lt"/>
-                <a:ea typeface="+mn-ea"/>
-                <a:cs typeface="+mn-cs"/>
-              </a:defRPr>
-            </a:lvl6pPr>
-            <a:lvl7pPr marL="2971800" indent="-228600" algn="l" defTabSz="914400" rtl="0" eaLnBrk="1" latinLnBrk="0" hangingPunct="1">
-              <a:lnSpc>
-                <a:spcPct val="90000"/>
-              </a:lnSpc>
-              <a:spcBef>
-                <a:spcPts val="500"/>
-              </a:spcBef>
-              <a:buFont typeface="Arial" panose="020B0604020202020204" pitchFamily="34" charset="0"/>
-              <a:buChar char="•"/>
-              <a:defRPr sz="1800" kern="1200">
-                <a:solidFill>
-                  <a:schemeClr val="tx1"/>
-                </a:solidFill>
-                <a:latin typeface="+mn-lt"/>
-                <a:ea typeface="+mn-ea"/>
-                <a:cs typeface="+mn-cs"/>
-              </a:defRPr>
-            </a:lvl7pPr>
-            <a:lvl8pPr marL="3429000" indent="-228600" algn="l" defTabSz="914400" rtl="0" eaLnBrk="1" latinLnBrk="0" hangingPunct="1">
-              <a:lnSpc>
-                <a:spcPct val="90000"/>
-              </a:lnSpc>
-              <a:spcBef>
-                <a:spcPts val="500"/>
-              </a:spcBef>
-              <a:buFont typeface="Arial" panose="020B0604020202020204" pitchFamily="34" charset="0"/>
-              <a:buChar char="•"/>
-              <a:defRPr sz="1800" kern="1200">
-                <a:solidFill>
-                  <a:schemeClr val="tx1"/>
-                </a:solidFill>
-                <a:latin typeface="+mn-lt"/>
-                <a:ea typeface="+mn-ea"/>
-                <a:cs typeface="+mn-cs"/>
-              </a:defRPr>
-            </a:lvl8pPr>
-            <a:lvl9pPr marL="3886200" indent="-228600" algn="l" defTabSz="914400" rtl="0" eaLnBrk="1" latinLnBrk="0" hangingPunct="1">
-              <a:lnSpc>
-                <a:spcPct val="90000"/>
-              </a:lnSpc>
-              <a:spcBef>
-                <a:spcPts val="500"/>
-              </a:spcBef>
-              <a:buFont typeface="Arial" panose="020B0604020202020204" pitchFamily="34" charset="0"/>
-              <a:buChar char="•"/>
-              <a:defRPr sz="1800" kern="1200">
-                <a:solidFill>
-                  <a:schemeClr val="tx1"/>
-                </a:solidFill>
-                <a:latin typeface="+mn-lt"/>
-                <a:ea typeface="+mn-ea"/>
-                <a:cs typeface="+mn-cs"/>
-              </a:defRPr>
-            </a:lvl9pPr>
-          </a:lstStyle>
-          <a:p>
-            <a:pPr marL="0" indent="0" algn="ctr">
-              <a:buFont typeface="Arial" panose="020B0604020202020204" pitchFamily="34" charset="0"/>
-              <a:buNone/>
-            </a:pPr>
-            <a:r>
-              <a:rPr lang="it-IT" b="1" dirty="0"/>
-              <a:t>Matrice quadrata</a:t>
-            </a:r>
-          </a:p>
-          <a:p>
-            <a:pPr marL="0" indent="0">
-              <a:buFont typeface="Arial" panose="020B0604020202020204" pitchFamily="34" charset="0"/>
-              <a:buNone/>
-            </a:pPr>
-            <a:r>
-              <a:rPr lang="it-IT" dirty="0"/>
-              <a:t>numero di righe = numero di colonne</a:t>
-            </a:r>
-          </a:p>
-        </p:txBody>
-      </p:sp>
       <mc:AlternateContent xmlns:mc="http://schemas.openxmlformats.org/markup-compatibility/2006" xmlns:a14="http://schemas.microsoft.com/office/drawing/2010/main">
         <mc:Choice Requires="a14">
           <p:sp>
@@ -5158,88 +4944,55 @@
           </a:p>
         </p:txBody>
       </p:sp>
-    </p:spTree>
-    <p:extLst>
-      <p:ext uri="{BB962C8B-B14F-4D97-AF65-F5344CB8AC3E}">
-        <p14:creationId xmlns:p14="http://schemas.microsoft.com/office/powerpoint/2010/main" val="387438836"/>
-      </p:ext>
-    </p:extLst>
-  </p:cSld>
-  <p:clrMapOvr>
-    <a:masterClrMapping/>
-  </p:clrMapOvr>
-</p:sld>
-</file>
-
-<file path=ppt/slides/slide11.xml><?xml version="1.0" encoding="utf-8"?>
-<p:sld xmlns:a="http://schemas.openxmlformats.org/drawingml/2006/main" xmlns:r="http://schemas.openxmlformats.org/officeDocument/2006/relationships" xmlns:p="http://schemas.openxmlformats.org/presentationml/2006/main">
-  <p:cSld>
-    <p:spTree>
-      <p:nvGrpSpPr>
-        <p:cNvPr id="1" name=""/>
-        <p:cNvGrpSpPr/>
-        <p:nvPr/>
-      </p:nvGrpSpPr>
-      <p:grpSpPr>
-        <a:xfrm>
-          <a:off x="0" y="0"/>
-          <a:ext cx="0" cy="0"/>
-          <a:chOff x="0" y="0"/>
-          <a:chExt cx="0" cy="0"/>
-        </a:xfrm>
-      </p:grpSpPr>
       <p:sp>
         <p:nvSpPr>
-          <p:cNvPr id="2" name="Titolo 1">
+          <p:cNvPr id="8" name="CasellaDiTesto 7">
             <a:extLst>
               <a:ext uri="{FF2B5EF4-FFF2-40B4-BE49-F238E27FC236}">
-                <a16:creationId xmlns:a16="http://schemas.microsoft.com/office/drawing/2014/main" id="{18A32D1E-57F0-4194-A6FC-D6AE6672E338}"/>
+                <a16:creationId xmlns:a16="http://schemas.microsoft.com/office/drawing/2014/main" id="{713462D9-1795-4114-81D0-C55C7E551323}"/>
               </a:ext>
             </a:extLst>
           </p:cNvPr>
-          <p:cNvSpPr>
-            <a:spLocks noGrp="1"/>
-          </p:cNvSpPr>
-          <p:nvPr>
-            <p:ph type="title"/>
-          </p:nvPr>
+          <p:cNvSpPr txBox="1"/>
+          <p:nvPr/>
         </p:nvSpPr>
         <p:spPr>
           <a:xfrm>
-            <a:off x="838200" y="365125"/>
-            <a:ext cx="10515600" cy="1325563"/>
+            <a:off x="5486400" y="4432515"/>
+            <a:ext cx="184731" cy="369332"/>
           </a:xfrm>
+          <a:prstGeom prst="rect">
+            <a:avLst/>
+          </a:prstGeom>
+          <a:noFill/>
         </p:spPr>
         <p:txBody>
-          <a:bodyPr/>
+          <a:bodyPr wrap="none" rtlCol="0">
+            <a:spAutoFit/>
+          </a:bodyPr>
           <a:lstStyle/>
           <a:p>
-            <a:r>
-              <a:rPr lang="it-IT" dirty="0"/>
-              <a:t>Matrici</a:t>
-            </a:r>
+            <a:endParaRPr lang="it-IT" dirty="0"/>
           </a:p>
         </p:txBody>
       </p:sp>
       <p:sp>
         <p:nvSpPr>
-          <p:cNvPr id="4" name="Segnaposto contenuto 2">
+          <p:cNvPr id="12" name="Segnaposto contenuto 2">
             <a:extLst>
               <a:ext uri="{FF2B5EF4-FFF2-40B4-BE49-F238E27FC236}">
-                <a16:creationId xmlns:a16="http://schemas.microsoft.com/office/drawing/2014/main" id="{91689680-E88A-4CA0-9C49-3684A0AB466F}"/>
+                <a16:creationId xmlns:a16="http://schemas.microsoft.com/office/drawing/2014/main" id="{B08BF741-C91C-4DC0-947D-ABAE32651375}"/>
               </a:ext>
             </a:extLst>
           </p:cNvPr>
           <p:cNvSpPr txBox="1">
-            <a:spLocks noGrp="1"/>
+            <a:spLocks/>
           </p:cNvSpPr>
-          <p:nvPr>
-            <p:ph idx="1"/>
-          </p:nvPr>
+          <p:nvPr/>
         </p:nvSpPr>
         <p:spPr>
           <a:xfrm>
-            <a:off x="838200" y="1825625"/>
+            <a:off x="838200" y="1862531"/>
             <a:ext cx="5257800" cy="902077"/>
           </a:xfrm>
           <a:prstGeom prst="rect">
@@ -5415,35 +5168,154 @@
             </a:lvl9pPr>
           </a:lstStyle>
           <a:p>
+            <a:pPr marL="0" indent="0" algn="ctr">
+              <a:buFont typeface="Arial" panose="020B0604020202020204" pitchFamily="34" charset="0"/>
+              <a:buNone/>
+            </a:pPr>
+            <a:r>
+              <a:rPr lang="it-IT" b="1" dirty="0"/>
+              <a:t>Matrice quadrata </a:t>
+            </a:r>
+          </a:p>
+          <a:p>
             <a:pPr marL="0" indent="0">
               <a:buFont typeface="Arial" panose="020B0604020202020204" pitchFamily="34" charset="0"/>
               <a:buNone/>
             </a:pPr>
             <a:r>
               <a:rPr lang="it-IT" dirty="0"/>
-              <a:t>Matrice quadrata: </a:t>
-            </a:r>
-          </a:p>
+              <a:t>numero di righe </a:t>
+            </a:r>
+            <a:r>
+              <a:rPr lang="it-IT" dirty="0">
+                <a:sym typeface="Symbol" panose="05050102010706020507" pitchFamily="18" charset="2"/>
+              </a:rPr>
+              <a:t>=</a:t>
+            </a:r>
+            <a:r>
+              <a:rPr lang="it-IT" dirty="0"/>
+              <a:t> numero di colonne</a:t>
+            </a:r>
+          </a:p>
+        </p:txBody>
+      </p:sp>
+    </p:spTree>
+    <p:extLst>
+      <p:ext uri="{BB962C8B-B14F-4D97-AF65-F5344CB8AC3E}">
+        <p14:creationId xmlns:p14="http://schemas.microsoft.com/office/powerpoint/2010/main" val="2135680727"/>
+      </p:ext>
+    </p:extLst>
+  </p:cSld>
+  <p:clrMapOvr>
+    <a:masterClrMapping/>
+  </p:clrMapOvr>
+</p:sld>
+</file>
+
+<file path=ppt/slides/slide11.xml><?xml version="1.0" encoding="utf-8"?>
+<p:sld xmlns:a="http://schemas.openxmlformats.org/drawingml/2006/main" xmlns:r="http://schemas.openxmlformats.org/officeDocument/2006/relationships" xmlns:p="http://schemas.openxmlformats.org/presentationml/2006/main">
+  <p:cSld>
+    <p:spTree>
+      <p:nvGrpSpPr>
+        <p:cNvPr id="1" name=""/>
+        <p:cNvGrpSpPr/>
+        <p:nvPr/>
+      </p:nvGrpSpPr>
+      <p:grpSpPr>
+        <a:xfrm>
+          <a:off x="0" y="0"/>
+          <a:ext cx="0" cy="0"/>
+          <a:chOff x="0" y="0"/>
+          <a:chExt cx="0" cy="0"/>
+        </a:xfrm>
+      </p:grpSpPr>
+      <p:sp>
+        <p:nvSpPr>
+          <p:cNvPr id="2" name="Titolo 1">
+            <a:extLst>
+              <a:ext uri="{FF2B5EF4-FFF2-40B4-BE49-F238E27FC236}">
+                <a16:creationId xmlns:a16="http://schemas.microsoft.com/office/drawing/2014/main" id="{18A32D1E-57F0-4194-A6FC-D6AE6672E338}"/>
+              </a:ext>
+            </a:extLst>
+          </p:cNvPr>
+          <p:cNvSpPr>
+            <a:spLocks noGrp="1"/>
+          </p:cNvSpPr>
+          <p:nvPr>
+            <p:ph type="title"/>
+          </p:nvPr>
+        </p:nvSpPr>
+        <p:spPr>
+          <a:xfrm>
+            <a:off x="838200" y="365125"/>
+            <a:ext cx="10515600" cy="1325563"/>
+          </a:xfrm>
+        </p:spPr>
+        <p:txBody>
+          <a:bodyPr/>
+          <a:lstStyle/>
+          <a:p>
+            <a:r>
+              <a:rPr lang="it-IT" dirty="0"/>
+              <a:t>Matrici</a:t>
+            </a:r>
+            <a:br>
+              <a:rPr lang="it-IT" dirty="0"/>
+            </a:br>
+            <a:r>
+              <a:rPr lang="it-IT" sz="2400" dirty="0"/>
+              <a:t>La diagonale</a:t>
+            </a:r>
+            <a:endParaRPr lang="it-IT" dirty="0"/>
+          </a:p>
+        </p:txBody>
+      </p:sp>
+      <p:sp>
+        <p:nvSpPr>
+          <p:cNvPr id="7" name="Segnaposto contenuto 6">
+            <a:extLst>
+              <a:ext uri="{FF2B5EF4-FFF2-40B4-BE49-F238E27FC236}">
+                <a16:creationId xmlns:a16="http://schemas.microsoft.com/office/drawing/2014/main" id="{6D046C0B-93C6-40F8-9187-CDBF0B88C3BA}"/>
+              </a:ext>
+            </a:extLst>
+          </p:cNvPr>
+          <p:cNvSpPr>
+            <a:spLocks noGrp="1"/>
+          </p:cNvSpPr>
+          <p:nvPr>
+            <p:ph idx="1"/>
+          </p:nvPr>
+        </p:nvSpPr>
+        <p:spPr>
+          <a:xfrm>
+            <a:off x="838200" y="1860003"/>
+            <a:ext cx="10227590" cy="898696"/>
+          </a:xfrm>
+        </p:spPr>
+        <p:txBody>
+          <a:bodyPr>
+            <a:normAutofit fontScale="92500"/>
+          </a:bodyPr>
+          <a:lstStyle/>
           <a:p>
             <a:pPr marL="0" indent="0">
-              <a:buFont typeface="Arial" panose="020B0604020202020204" pitchFamily="34" charset="0"/>
               <a:buNone/>
             </a:pPr>
             <a:r>
               <a:rPr lang="it-IT" dirty="0"/>
-              <a:t>numero di righe = numero di colonne</a:t>
+              <a:t>La diagonale di una matrice quadrata è composta dai numeri che hanno indice di riga uguale a indice di colonna. Sono quelli evidenziati in rosso.</a:t>
             </a:r>
           </a:p>
         </p:txBody>
       </p:sp>
-      <mc:AlternateContent xmlns:mc="http://schemas.openxmlformats.org/markup-compatibility/2006" xmlns:a14="http://schemas.microsoft.com/office/drawing/2010/main">
-        <mc:Choice Requires="a14">
+      <mc:AlternateContent xmlns:mc="http://schemas.openxmlformats.org/markup-compatibility/2006">
+        <mc:Choice xmlns:a14="http://schemas.microsoft.com/office/drawing/2010/main" Requires="a14">
           <p:sp>
             <p:nvSpPr>
-              <p:cNvPr id="5" name="CasellaDiTesto 4">
+              <p:cNvPr id="11" name="CasellaDiTesto 10">
                 <a:extLst>
                   <a:ext uri="{FF2B5EF4-FFF2-40B4-BE49-F238E27FC236}">
-                    <a16:creationId xmlns:a16="http://schemas.microsoft.com/office/drawing/2014/main" id="{617C67D5-6B42-43B9-84A8-9666F0931420}"/>
+                    <a16:creationId xmlns:a16="http://schemas.microsoft.com/office/drawing/2014/main" id="{EE1D12A9-B88E-40E8-9B00-DD3632BFC466}"/>
                   </a:ext>
                 </a:extLst>
               </p:cNvPr>
@@ -5452,8 +5324,8 @@
             </p:nvSpPr>
             <p:spPr>
               <a:xfrm>
-                <a:off x="8417112" y="3286749"/>
-                <a:ext cx="1615635" cy="738215"/>
+                <a:off x="4695434" y="3361087"/>
+                <a:ext cx="1256561" cy="738215"/>
               </a:xfrm>
               <a:prstGeom prst="rect">
                 <a:avLst/>
@@ -5489,7 +5361,7 @@
                               <m:mcs>
                                 <m:mc>
                                   <m:mcPr>
-                                    <m:count m:val="4"/>
+                                    <m:count m:val="3"/>
                                     <m:mcJc m:val="center"/>
                                   </m:mcPr>
                                 </m:mc>
@@ -5507,6 +5379,9 @@
                                     <m:brk m:alnAt="7"/>
                                   </m:rPr>
                                   <a:rPr lang="it-IT" b="0" i="1" smtClean="0">
+                                    <a:solidFill>
+                                      <a:srgbClr val="FF0000"/>
+                                    </a:solidFill>
                                     <a:latin typeface="Cambria Math" panose="02040503050406030204" pitchFamily="18" charset="0"/>
                                   </a:rPr>
                                   <m:t>7</m:t>
@@ -5526,14 +5401,6 @@
                                     <a:latin typeface="Cambria Math" panose="02040503050406030204" pitchFamily="18" charset="0"/>
                                   </a:rPr>
                                   <m:t>5</m:t>
-                                </m:r>
-                              </m:e>
-                              <m:e>
-                                <m:r>
-                                  <a:rPr lang="it-IT" b="0" i="1" smtClean="0">
-                                    <a:latin typeface="Cambria Math" panose="02040503050406030204" pitchFamily="18" charset="0"/>
-                                  </a:rPr>
-                                  <m:t>0</m:t>
                                 </m:r>
                               </m:e>
                             </m:mr>
@@ -5549,6 +5416,9 @@
                               <m:e>
                                 <m:r>
                                   <a:rPr lang="it-IT" b="0" i="1" smtClean="0">
+                                    <a:solidFill>
+                                      <a:srgbClr val="FF0000"/>
+                                    </a:solidFill>
                                     <a:latin typeface="Cambria Math" panose="02040503050406030204" pitchFamily="18" charset="0"/>
                                   </a:rPr>
                                   <m:t>−4</m:t>
@@ -5560,14 +5430,6 @@
                                     <a:latin typeface="Cambria Math" panose="02040503050406030204" pitchFamily="18" charset="0"/>
                                   </a:rPr>
                                   <m:t>2</m:t>
-                                </m:r>
-                              </m:e>
-                              <m:e>
-                                <m:r>
-                                  <a:rPr lang="it-IT" b="0" i="1" smtClean="0">
-                                    <a:latin typeface="Cambria Math" panose="02040503050406030204" pitchFamily="18" charset="0"/>
-                                  </a:rPr>
-                                  <m:t>1</m:t>
                                 </m:r>
                               </m:e>
                             </m:mr>
@@ -5591,17 +5453,12 @@
                               <m:e>
                                 <m:r>
                                   <a:rPr lang="it-IT" b="0" i="1" smtClean="0">
+                                    <a:solidFill>
+                                      <a:srgbClr val="FF0000"/>
+                                    </a:solidFill>
                                     <a:latin typeface="Cambria Math" panose="02040503050406030204" pitchFamily="18" charset="0"/>
                                   </a:rPr>
                                   <m:t>0</m:t>
-                                </m:r>
-                              </m:e>
-                              <m:e>
-                                <m:r>
-                                  <a:rPr lang="it-IT" b="0" i="1" smtClean="0">
-                                    <a:latin typeface="Cambria Math" panose="02040503050406030204" pitchFamily="18" charset="0"/>
-                                  </a:rPr>
-                                  <m:t>1</m:t>
                                 </m:r>
                               </m:e>
                             </m:mr>
@@ -5616,13 +5473,13 @@
             </p:txBody>
           </p:sp>
         </mc:Choice>
-        <mc:Fallback xmlns="">
+        <mc:Fallback>
           <p:sp>
             <p:nvSpPr>
-              <p:cNvPr id="5" name="CasellaDiTesto 4">
+              <p:cNvPr id="11" name="CasellaDiTesto 10">
                 <a:extLst>
                   <a:ext uri="{FF2B5EF4-FFF2-40B4-BE49-F238E27FC236}">
-                    <a16:creationId xmlns:a16="http://schemas.microsoft.com/office/drawing/2014/main" id="{617C67D5-6B42-43B9-84A8-9666F0931420}"/>
+                    <a16:creationId xmlns:a16="http://schemas.microsoft.com/office/drawing/2014/main" id="{EE1D12A9-B88E-40E8-9B00-DD3632BFC466}"/>
                   </a:ext>
                 </a:extLst>
               </p:cNvPr>
@@ -5633,8 +5490,8 @@
             </p:nvSpPr>
             <p:spPr>
               <a:xfrm>
-                <a:off x="8417112" y="3286749"/>
-                <a:ext cx="1615635" cy="738215"/>
+                <a:off x="4695434" y="3361087"/>
+                <a:ext cx="1256561" cy="738215"/>
               </a:xfrm>
               <a:prstGeom prst="rect">
                 <a:avLst/>
@@ -5663,10 +5520,10 @@
       </mc:AlternateContent>
       <p:sp>
         <p:nvSpPr>
-          <p:cNvPr id="15" name="Segnaposto contenuto 2">
+          <p:cNvPr id="12" name="Segnaposto contenuto 6">
             <a:extLst>
               <a:ext uri="{FF2B5EF4-FFF2-40B4-BE49-F238E27FC236}">
-                <a16:creationId xmlns:a16="http://schemas.microsoft.com/office/drawing/2014/main" id="{8453BC0F-D4A1-4D08-9519-B85025BA33F0}"/>
+                <a16:creationId xmlns:a16="http://schemas.microsoft.com/office/drawing/2014/main" id="{22952EF8-E9B8-4881-870B-EF5A5CC22D3E}"/>
               </a:ext>
             </a:extLst>
           </p:cNvPr>
@@ -5677,8 +5534,8 @@
         </p:nvSpPr>
         <p:spPr>
           <a:xfrm>
-            <a:off x="6596030" y="1767873"/>
-            <a:ext cx="5257800" cy="902077"/>
+            <a:off x="838200" y="4972580"/>
+            <a:ext cx="10227590" cy="898696"/>
           </a:xfrm>
           <a:prstGeom prst="rect">
             <a:avLst/>
@@ -5686,7 +5543,7 @@
         </p:spPr>
         <p:txBody>
           <a:bodyPr vert="horz" lIns="91440" tIns="45720" rIns="91440" bIns="45720" rtlCol="0">
-            <a:normAutofit fontScale="92500" lnSpcReduction="10000"/>
+            <a:normAutofit/>
           </a:bodyPr>
           <a:lstStyle>
             <a:lvl1pPr marL="228600" indent="-228600" algn="l" defTabSz="914400" rtl="0" eaLnBrk="1" latinLnBrk="0" hangingPunct="1">
@@ -5859,39 +5716,147 @@
             </a:pPr>
             <a:r>
               <a:rPr lang="it-IT" dirty="0"/>
-              <a:t>Matrice rettangolare: </a:t>
-            </a:r>
-          </a:p>
-          <a:p>
-            <a:pPr marL="0" indent="0">
-              <a:buFont typeface="Arial" panose="020B0604020202020204" pitchFamily="34" charset="0"/>
-              <a:buNone/>
-            </a:pPr>
-            <a:r>
-              <a:rPr lang="it-IT" dirty="0"/>
-              <a:t>numero di righe </a:t>
-            </a:r>
-            <a:r>
-              <a:rPr lang="it-IT" dirty="0">
-                <a:sym typeface="Symbol" panose="05050102010706020507" pitchFamily="18" charset="2"/>
-              </a:rPr>
-              <a:t></a:t>
-            </a:r>
-            <a:r>
-              <a:rPr lang="it-IT" dirty="0"/>
-              <a:t> numero di colonne</a:t>
+              <a:t>Attenzione! Non esiste la diagonale di una matrice rettangolare, tuttavia dobbiamo </a:t>
             </a:r>
           </a:p>
         </p:txBody>
       </p:sp>
-      <mc:AlternateContent xmlns:mc="http://schemas.openxmlformats.org/markup-compatibility/2006" xmlns:a14="http://schemas.microsoft.com/office/drawing/2010/main">
-        <mc:Choice Requires="a14">
+    </p:spTree>
+    <p:extLst>
+      <p:ext uri="{BB962C8B-B14F-4D97-AF65-F5344CB8AC3E}">
+        <p14:creationId xmlns:p14="http://schemas.microsoft.com/office/powerpoint/2010/main" val="387438836"/>
+      </p:ext>
+    </p:extLst>
+  </p:cSld>
+  <p:clrMapOvr>
+    <a:masterClrMapping/>
+  </p:clrMapOvr>
+</p:sld>
+</file>
+
+<file path=ppt/slides/slide12.xml><?xml version="1.0" encoding="utf-8"?>
+<p:sld xmlns:a="http://schemas.openxmlformats.org/drawingml/2006/main" xmlns:r="http://schemas.openxmlformats.org/officeDocument/2006/relationships" xmlns:p="http://schemas.openxmlformats.org/presentationml/2006/main">
+  <p:cSld>
+    <p:spTree>
+      <p:nvGrpSpPr>
+        <p:cNvPr id="1" name=""/>
+        <p:cNvGrpSpPr/>
+        <p:nvPr/>
+      </p:nvGrpSpPr>
+      <p:grpSpPr>
+        <a:xfrm>
+          <a:off x="0" y="0"/>
+          <a:ext cx="0" cy="0"/>
+          <a:chOff x="0" y="0"/>
+          <a:chExt cx="0" cy="0"/>
+        </a:xfrm>
+      </p:grpSpPr>
+      <p:sp>
+        <p:nvSpPr>
+          <p:cNvPr id="2" name="Titolo 1">
+            <a:extLst>
+              <a:ext uri="{FF2B5EF4-FFF2-40B4-BE49-F238E27FC236}">
+                <a16:creationId xmlns:a16="http://schemas.microsoft.com/office/drawing/2014/main" id="{18A32D1E-57F0-4194-A6FC-D6AE6672E338}"/>
+              </a:ext>
+            </a:extLst>
+          </p:cNvPr>
+          <p:cNvSpPr>
+            <a:spLocks noGrp="1"/>
+          </p:cNvSpPr>
+          <p:nvPr>
+            <p:ph type="title"/>
+          </p:nvPr>
+        </p:nvSpPr>
+        <p:spPr>
+          <a:xfrm>
+            <a:off x="838200" y="365125"/>
+            <a:ext cx="10515600" cy="1325563"/>
+          </a:xfrm>
+        </p:spPr>
+        <p:txBody>
+          <a:bodyPr/>
+          <a:lstStyle/>
+          <a:p>
+            <a:r>
+              <a:rPr lang="it-IT" dirty="0"/>
+              <a:t>Metodo di Gauss</a:t>
+            </a:r>
+          </a:p>
+        </p:txBody>
+      </p:sp>
+      <p:sp>
+        <p:nvSpPr>
+          <p:cNvPr id="8" name="CasellaDiTesto 7">
+            <a:extLst>
+              <a:ext uri="{FF2B5EF4-FFF2-40B4-BE49-F238E27FC236}">
+                <a16:creationId xmlns:a16="http://schemas.microsoft.com/office/drawing/2014/main" id="{5096C81B-5B07-4268-ADCF-C6DBD20E73EC}"/>
+              </a:ext>
+            </a:extLst>
+          </p:cNvPr>
+          <p:cNvSpPr txBox="1"/>
+          <p:nvPr/>
+        </p:nvSpPr>
+        <p:spPr>
+          <a:xfrm>
+            <a:off x="946688" y="1600200"/>
+            <a:ext cx="9049719" cy="1754326"/>
+          </a:xfrm>
+          <a:prstGeom prst="rect">
+            <a:avLst/>
+          </a:prstGeom>
+          <a:noFill/>
+        </p:spPr>
+        <p:txBody>
+          <a:bodyPr wrap="square" rtlCol="0">
+            <a:spAutoFit/>
+          </a:bodyPr>
+          <a:lstStyle/>
+          <a:p>
+            <a:r>
+              <a:rPr lang="it-IT" dirty="0"/>
+              <a:t>Il nostro obiettivo è quello di rendere a gradini la matrice completa associata al sistema lineare. Per farlo possiamo utilizzare tre mosse:</a:t>
+            </a:r>
+          </a:p>
+          <a:p>
+            <a:pPr marL="620713" indent="-285750">
+              <a:buFont typeface="Arial" panose="020B0604020202020204" pitchFamily="34" charset="0"/>
+              <a:buChar char="•"/>
+            </a:pPr>
+            <a:r>
+              <a:rPr lang="it-IT" dirty="0"/>
+              <a:t>Scambio di due righe</a:t>
+            </a:r>
+          </a:p>
+          <a:p>
+            <a:pPr marL="620713" indent="-285750">
+              <a:buFont typeface="Arial" panose="020B0604020202020204" pitchFamily="34" charset="0"/>
+              <a:buChar char="•"/>
+            </a:pPr>
+            <a:r>
+              <a:rPr lang="it-IT" dirty="0"/>
+              <a:t>Moltiplicare una riga della matrice per un numero diverso da zero</a:t>
+            </a:r>
+          </a:p>
+          <a:p>
+            <a:pPr marL="620713" indent="-285750">
+              <a:buFont typeface="Arial" panose="020B0604020202020204" pitchFamily="34" charset="0"/>
+              <a:buChar char="•"/>
+            </a:pPr>
+            <a:r>
+              <a:rPr lang="it-IT" dirty="0"/>
+              <a:t>Sostituire una riga della matrice con un’altra ottenuta sommando ad essa un multiplo di un’altra riga</a:t>
+            </a:r>
+          </a:p>
+        </p:txBody>
+      </p:sp>
+      <mc:AlternateContent xmlns:mc="http://schemas.openxmlformats.org/markup-compatibility/2006">
+        <mc:Choice xmlns:a14="http://schemas.microsoft.com/office/drawing/2010/main" Requires="a14">
           <p:sp>
             <p:nvSpPr>
-              <p:cNvPr id="16" name="CasellaDiTesto 15">
+              <p:cNvPr id="12" name="CasellaDiTesto 11">
                 <a:extLst>
                   <a:ext uri="{FF2B5EF4-FFF2-40B4-BE49-F238E27FC236}">
-                    <a16:creationId xmlns:a16="http://schemas.microsoft.com/office/drawing/2014/main" id="{17501F4B-E4B5-4368-97D4-A089C13260E3}"/>
+                    <a16:creationId xmlns:a16="http://schemas.microsoft.com/office/drawing/2014/main" id="{3EB25061-93F0-4F2F-B935-F4EC8E939BD7}"/>
                   </a:ext>
                 </a:extLst>
               </p:cNvPr>
@@ -5900,8 +5865,8 @@
             </p:nvSpPr>
             <p:spPr>
               <a:xfrm>
-                <a:off x="2159253" y="3228264"/>
-                <a:ext cx="1256561" cy="738215"/>
+                <a:off x="4596171" y="4480526"/>
+                <a:ext cx="1788758" cy="732636"/>
               </a:xfrm>
               <a:prstGeom prst="rect">
                 <a:avLst/>
@@ -5937,7 +5902,7 @@
                               <m:mcs>
                                 <m:mc>
                                   <m:mcPr>
-                                    <m:count m:val="3"/>
+                                    <m:count m:val="4"/>
                                     <m:mcJc m:val="center"/>
                                   </m:mcPr>
                                 </m:mc>
@@ -5957,7 +5922,7 @@
                                   <a:rPr lang="it-IT" b="0" i="1" smtClean="0">
                                     <a:latin typeface="Cambria Math" panose="02040503050406030204" pitchFamily="18" charset="0"/>
                                   </a:rPr>
-                                  <m:t>7</m:t>
+                                  <m:t>1</m:t>
                                 </m:r>
                               </m:e>
                               <m:e>
@@ -5965,7 +5930,7 @@
                                   <a:rPr lang="it-IT" b="0" i="1" smtClean="0">
                                     <a:latin typeface="Cambria Math" panose="02040503050406030204" pitchFamily="18" charset="0"/>
                                   </a:rPr>
-                                  <m:t>6</m:t>
+                                  <m:t>1</m:t>
                                 </m:r>
                               </m:e>
                               <m:e>
@@ -5973,7 +5938,15 @@
                                   <a:rPr lang="it-IT" b="0" i="1" smtClean="0">
                                     <a:latin typeface="Cambria Math" panose="02040503050406030204" pitchFamily="18" charset="0"/>
                                   </a:rPr>
-                                  <m:t>5</m:t>
+                                  <m:t>1</m:t>
+                                </m:r>
+                              </m:e>
+                              <m:e>
+                                <m:r>
+                                  <a:rPr lang="it-IT" b="0" i="1" smtClean="0">
+                                    <a:latin typeface="Cambria Math" panose="02040503050406030204" pitchFamily="18" charset="0"/>
+                                  </a:rPr>
+                                  <m:t>12</m:t>
                                 </m:r>
                               </m:e>
                             </m:mr>
@@ -5983,7 +5956,7 @@
                                   <a:rPr lang="it-IT" b="0" i="1" smtClean="0">
                                     <a:latin typeface="Cambria Math" panose="02040503050406030204" pitchFamily="18" charset="0"/>
                                   </a:rPr>
-                                  <m:t>0</m:t>
+                                  <m:t>1</m:t>
                                 </m:r>
                               </m:e>
                               <m:e>
@@ -5991,7 +5964,7 @@
                                   <a:rPr lang="it-IT" b="0" i="1" smtClean="0">
                                     <a:latin typeface="Cambria Math" panose="02040503050406030204" pitchFamily="18" charset="0"/>
                                   </a:rPr>
-                                  <m:t>−4</m:t>
+                                  <m:t>2</m:t>
                                 </m:r>
                               </m:e>
                               <m:e>
@@ -5999,7 +5972,21 @@
                                   <a:rPr lang="it-IT" b="0" i="1" smtClean="0">
                                     <a:latin typeface="Cambria Math" panose="02040503050406030204" pitchFamily="18" charset="0"/>
                                   </a:rPr>
+                                  <m:t>−</m:t>
+                                </m:r>
+                                <m:r>
+                                  <a:rPr lang="it-IT" b="0" i="1" smtClean="0">
+                                    <a:latin typeface="Cambria Math" panose="02040503050406030204" pitchFamily="18" charset="0"/>
+                                  </a:rPr>
                                   <m:t>2</m:t>
+                                </m:r>
+                              </m:e>
+                              <m:e>
+                                <m:r>
+                                  <a:rPr lang="it-IT" b="0" i="1" smtClean="0">
+                                    <a:latin typeface="Cambria Math" panose="02040503050406030204" pitchFamily="18" charset="0"/>
+                                  </a:rPr>
+                                  <m:t>1</m:t>
                                 </m:r>
                               </m:e>
                             </m:mr>
@@ -6009,7 +5996,7 @@
                                   <a:rPr lang="it-IT" b="0" i="1" smtClean="0">
                                     <a:latin typeface="Cambria Math" panose="02040503050406030204" pitchFamily="18" charset="0"/>
                                   </a:rPr>
-                                  <m:t>5</m:t>
+                                  <m:t>2</m:t>
                                 </m:r>
                               </m:e>
                               <m:e>
@@ -6017,7 +6004,7 @@
                                   <a:rPr lang="it-IT" b="0" i="1" smtClean="0">
                                     <a:latin typeface="Cambria Math" panose="02040503050406030204" pitchFamily="18" charset="0"/>
                                   </a:rPr>
-                                  <m:t>7</m:t>
+                                  <m:t>1</m:t>
                                 </m:r>
                               </m:e>
                               <m:e>
@@ -6025,7 +6012,21 @@
                                   <a:rPr lang="it-IT" b="0" i="1" smtClean="0">
                                     <a:latin typeface="Cambria Math" panose="02040503050406030204" pitchFamily="18" charset="0"/>
                                   </a:rPr>
-                                  <m:t>0</m:t>
+                                  <m:t>−</m:t>
+                                </m:r>
+                                <m:r>
+                                  <a:rPr lang="it-IT" b="0" i="1" smtClean="0">
+                                    <a:latin typeface="Cambria Math" panose="02040503050406030204" pitchFamily="18" charset="0"/>
+                                  </a:rPr>
+                                  <m:t>3</m:t>
+                                </m:r>
+                              </m:e>
+                              <m:e>
+                                <m:r>
+                                  <a:rPr lang="it-IT" b="0" i="1" smtClean="0">
+                                    <a:latin typeface="Cambria Math" panose="02040503050406030204" pitchFamily="18" charset="0"/>
+                                  </a:rPr>
+                                  <m:t>−5</m:t>
                                 </m:r>
                               </m:e>
                             </m:mr>
@@ -6040,13 +6041,13 @@
             </p:txBody>
           </p:sp>
         </mc:Choice>
-        <mc:Fallback xmlns="">
+        <mc:Fallback>
           <p:sp>
             <p:nvSpPr>
-              <p:cNvPr id="16" name="CasellaDiTesto 15">
+              <p:cNvPr id="12" name="CasellaDiTesto 11">
                 <a:extLst>
                   <a:ext uri="{FF2B5EF4-FFF2-40B4-BE49-F238E27FC236}">
-                    <a16:creationId xmlns:a16="http://schemas.microsoft.com/office/drawing/2014/main" id="{17501F4B-E4B5-4368-97D4-A089C13260E3}"/>
+                    <a16:creationId xmlns:a16="http://schemas.microsoft.com/office/drawing/2014/main" id="{3EB25061-93F0-4F2F-B935-F4EC8E939BD7}"/>
                   </a:ext>
                 </a:extLst>
               </p:cNvPr>
@@ -6057,8 +6058,245 @@
             </p:nvSpPr>
             <p:spPr>
               <a:xfrm>
-                <a:off x="2159253" y="3228264"/>
-                <a:ext cx="1256561" cy="738215"/>
+                <a:off x="4596171" y="4480526"/>
+                <a:ext cx="1788758" cy="732636"/>
+              </a:xfrm>
+              <a:prstGeom prst="rect">
+                <a:avLst/>
+              </a:prstGeom>
+              <a:blipFill>
+                <a:blip r:embed="rId2"/>
+                <a:stretch>
+                  <a:fillRect/>
+                </a:stretch>
+              </a:blipFill>
+            </p:spPr>
+            <p:txBody>
+              <a:bodyPr/>
+              <a:lstStyle/>
+              <a:p>
+                <a:r>
+                  <a:rPr lang="it-IT">
+                    <a:noFill/>
+                  </a:rPr>
+                  <a:t> </a:t>
+                </a:r>
+              </a:p>
+            </p:txBody>
+          </p:sp>
+        </mc:Fallback>
+      </mc:AlternateContent>
+      <mc:AlternateContent xmlns:mc="http://schemas.openxmlformats.org/markup-compatibility/2006">
+        <mc:Choice xmlns:a14="http://schemas.microsoft.com/office/drawing/2010/main" Requires="a14">
+          <p:sp>
+            <p:nvSpPr>
+              <p:cNvPr id="13" name="CasellaDiTesto 12">
+                <a:extLst>
+                  <a:ext uri="{FF2B5EF4-FFF2-40B4-BE49-F238E27FC236}">
+                    <a16:creationId xmlns:a16="http://schemas.microsoft.com/office/drawing/2014/main" id="{4945145A-084B-4369-BE57-7C1FAF79C4B1}"/>
+                  </a:ext>
+                </a:extLst>
+              </p:cNvPr>
+              <p:cNvSpPr txBox="1"/>
+              <p:nvPr/>
+            </p:nvSpPr>
+            <p:spPr>
+              <a:xfrm>
+                <a:off x="7926035" y="4480526"/>
+                <a:ext cx="1917000" cy="732573"/>
+              </a:xfrm>
+              <a:prstGeom prst="rect">
+                <a:avLst/>
+              </a:prstGeom>
+              <a:noFill/>
+            </p:spPr>
+            <p:txBody>
+              <a:bodyPr wrap="none" lIns="0" tIns="0" rIns="0" bIns="0" rtlCol="0">
+                <a:spAutoFit/>
+              </a:bodyPr>
+              <a:lstStyle/>
+              <a:p>
+                <a:pPr/>
+                <a14:m>
+                  <m:oMathPara xmlns:m="http://schemas.openxmlformats.org/officeDocument/2006/math">
+                    <m:oMathParaPr>
+                      <m:jc m:val="centerGroup"/>
+                    </m:oMathParaPr>
+                    <m:oMath xmlns:m="http://schemas.openxmlformats.org/officeDocument/2006/math">
+                      <m:d>
+                        <m:dPr>
+                          <m:begChr m:val="["/>
+                          <m:endChr m:val="]"/>
+                          <m:ctrlPr>
+                            <a:rPr lang="it-IT" i="1" smtClean="0">
+                              <a:latin typeface="Cambria Math" panose="02040503050406030204" pitchFamily="18" charset="0"/>
+                            </a:rPr>
+                          </m:ctrlPr>
+                        </m:dPr>
+                        <m:e>
+                          <m:m>
+                            <m:mPr>
+                              <m:mcs>
+                                <m:mc>
+                                  <m:mcPr>
+                                    <m:count m:val="4"/>
+                                    <m:mcJc m:val="center"/>
+                                  </m:mcPr>
+                                </m:mc>
+                              </m:mcs>
+                              <m:ctrlPr>
+                                <a:rPr lang="it-IT" b="0" i="1" smtClean="0">
+                                  <a:latin typeface="Cambria Math" panose="02040503050406030204" pitchFamily="18" charset="0"/>
+                                </a:rPr>
+                              </m:ctrlPr>
+                            </m:mPr>
+                            <m:mr>
+                              <m:e>
+                                <m:r>
+                                  <m:rPr>
+                                    <m:brk m:alnAt="7"/>
+                                  </m:rPr>
+                                  <a:rPr lang="it-IT" b="0" i="1" smtClean="0">
+                                    <a:latin typeface="Cambria Math" panose="02040503050406030204" pitchFamily="18" charset="0"/>
+                                  </a:rPr>
+                                  <m:t>1</m:t>
+                                </m:r>
+                              </m:e>
+                              <m:e>
+                                <m:r>
+                                  <a:rPr lang="it-IT" b="0" i="1" smtClean="0">
+                                    <a:latin typeface="Cambria Math" panose="02040503050406030204" pitchFamily="18" charset="0"/>
+                                  </a:rPr>
+                                  <m:t>1</m:t>
+                                </m:r>
+                              </m:e>
+                              <m:e>
+                                <m:r>
+                                  <a:rPr lang="it-IT" b="0" i="1" smtClean="0">
+                                    <a:latin typeface="Cambria Math" panose="02040503050406030204" pitchFamily="18" charset="0"/>
+                                  </a:rPr>
+                                  <m:t>1</m:t>
+                                </m:r>
+                              </m:e>
+                              <m:e>
+                                <m:r>
+                                  <a:rPr lang="it-IT" b="0" i="1" smtClean="0">
+                                    <a:latin typeface="Cambria Math" panose="02040503050406030204" pitchFamily="18" charset="0"/>
+                                  </a:rPr>
+                                  <m:t>12</m:t>
+                                </m:r>
+                              </m:e>
+                            </m:mr>
+                            <m:mr>
+                              <m:e>
+                                <m:r>
+                                  <a:rPr lang="it-IT" b="0" i="1" smtClean="0">
+                                    <a:latin typeface="Cambria Math" panose="02040503050406030204" pitchFamily="18" charset="0"/>
+                                  </a:rPr>
+                                  <m:t>0</m:t>
+                                </m:r>
+                              </m:e>
+                              <m:e>
+                                <m:r>
+                                  <a:rPr lang="it-IT" b="0" i="1" smtClean="0">
+                                    <a:latin typeface="Cambria Math" panose="02040503050406030204" pitchFamily="18" charset="0"/>
+                                  </a:rPr>
+                                  <m:t>1</m:t>
+                                </m:r>
+                              </m:e>
+                              <m:e>
+                                <m:r>
+                                  <a:rPr lang="it-IT" b="0" i="1" smtClean="0">
+                                    <a:latin typeface="Cambria Math" panose="02040503050406030204" pitchFamily="18" charset="0"/>
+                                  </a:rPr>
+                                  <m:t>−3</m:t>
+                                </m:r>
+                              </m:e>
+                              <m:e>
+                                <m:r>
+                                  <a:rPr lang="it-IT" b="0" i="1" smtClean="0">
+                                    <a:latin typeface="Cambria Math" panose="02040503050406030204" pitchFamily="18" charset="0"/>
+                                  </a:rPr>
+                                  <m:t>−1</m:t>
+                                </m:r>
+                                <m:r>
+                                  <a:rPr lang="it-IT" b="0" i="1" smtClean="0">
+                                    <a:latin typeface="Cambria Math" panose="02040503050406030204" pitchFamily="18" charset="0"/>
+                                  </a:rPr>
+                                  <m:t>1</m:t>
+                                </m:r>
+                              </m:e>
+                            </m:mr>
+                            <m:mr>
+                              <m:e>
+                                <m:r>
+                                  <a:rPr lang="it-IT" b="0" i="1" smtClean="0">
+                                    <a:latin typeface="Cambria Math" panose="02040503050406030204" pitchFamily="18" charset="0"/>
+                                  </a:rPr>
+                                  <m:t>0</m:t>
+                                </m:r>
+                              </m:e>
+                              <m:e>
+                                <m:r>
+                                  <a:rPr lang="it-IT" b="0" i="1" smtClean="0">
+                                    <a:latin typeface="Cambria Math" panose="02040503050406030204" pitchFamily="18" charset="0"/>
+                                  </a:rPr>
+                                  <m:t>0</m:t>
+                                </m:r>
+                              </m:e>
+                              <m:e>
+                                <m:r>
+                                  <a:rPr lang="it-IT" b="0" i="1" smtClean="0">
+                                    <a:latin typeface="Cambria Math" panose="02040503050406030204" pitchFamily="18" charset="0"/>
+                                  </a:rPr>
+                                  <m:t>−</m:t>
+                                </m:r>
+                                <m:r>
+                                  <a:rPr lang="it-IT" b="0" i="1" smtClean="0">
+                                    <a:latin typeface="Cambria Math" panose="02040503050406030204" pitchFamily="18" charset="0"/>
+                                  </a:rPr>
+                                  <m:t>8</m:t>
+                                </m:r>
+                              </m:e>
+                              <m:e>
+                                <m:r>
+                                  <a:rPr lang="it-IT" b="0" i="1" smtClean="0">
+                                    <a:latin typeface="Cambria Math" panose="02040503050406030204" pitchFamily="18" charset="0"/>
+                                  </a:rPr>
+                                  <m:t>−40</m:t>
+                                </m:r>
+                              </m:e>
+                            </m:mr>
+                          </m:m>
+                        </m:e>
+                      </m:d>
+                    </m:oMath>
+                  </m:oMathPara>
+                </a14:m>
+                <a:endParaRPr lang="it-IT" dirty="0"/>
+              </a:p>
+            </p:txBody>
+          </p:sp>
+        </mc:Choice>
+        <mc:Fallback>
+          <p:sp>
+            <p:nvSpPr>
+              <p:cNvPr id="13" name="CasellaDiTesto 12">
+                <a:extLst>
+                  <a:ext uri="{FF2B5EF4-FFF2-40B4-BE49-F238E27FC236}">
+                    <a16:creationId xmlns:a16="http://schemas.microsoft.com/office/drawing/2014/main" id="{4945145A-084B-4369-BE57-7C1FAF79C4B1}"/>
+                  </a:ext>
+                </a:extLst>
+              </p:cNvPr>
+              <p:cNvSpPr txBox="1">
+                <a:spLocks noRot="1" noChangeAspect="1" noMove="1" noResize="1" noEditPoints="1" noAdjustHandles="1" noChangeArrowheads="1" noChangeShapeType="1" noTextEdit="1"/>
+              </p:cNvSpPr>
+              <p:nvPr/>
+            </p:nvSpPr>
+            <p:spPr>
+              <a:xfrm>
+                <a:off x="7926035" y="4480526"/>
+                <a:ext cx="1917000" cy="732573"/>
               </a:xfrm>
               <a:prstGeom prst="rect">
                 <a:avLst/>
@@ -6085,76 +6323,343 @@
           </p:sp>
         </mc:Fallback>
       </mc:AlternateContent>
-      <p:sp>
-        <p:nvSpPr>
-          <p:cNvPr id="3" name="CasellaDiTesto 2">
+      <mc:AlternateContent xmlns:mc="http://schemas.openxmlformats.org/markup-compatibility/2006">
+        <mc:Choice xmlns:a14="http://schemas.microsoft.com/office/drawing/2010/main" Requires="a14">
+          <p:sp>
+            <p:nvSpPr>
+              <p:cNvPr id="14" name="CasellaDiTesto 13">
+                <a:extLst>
+                  <a:ext uri="{FF2B5EF4-FFF2-40B4-BE49-F238E27FC236}">
+                    <a16:creationId xmlns:a16="http://schemas.microsoft.com/office/drawing/2014/main" id="{CA5A7C94-49AA-4482-80DF-31971186D645}"/>
+                  </a:ext>
+                </a:extLst>
+              </p:cNvPr>
+              <p:cNvSpPr txBox="1"/>
+              <p:nvPr/>
+            </p:nvSpPr>
+            <p:spPr>
+              <a:xfrm>
+                <a:off x="1138816" y="4423888"/>
+                <a:ext cx="1981247" cy="884281"/>
+              </a:xfrm>
+              <a:prstGeom prst="rect">
+                <a:avLst/>
+              </a:prstGeom>
+              <a:noFill/>
+            </p:spPr>
+            <p:txBody>
+              <a:bodyPr wrap="none" lIns="0" tIns="0" rIns="0" bIns="0" rtlCol="0">
+                <a:spAutoFit/>
+              </a:bodyPr>
+              <a:lstStyle/>
+              <a:p>
+                <a:pPr/>
+                <a14:m>
+                  <m:oMathPara xmlns:m="http://schemas.openxmlformats.org/officeDocument/2006/math">
+                    <m:oMathParaPr>
+                      <m:jc m:val="centerGroup"/>
+                    </m:oMathParaPr>
+                    <m:oMath xmlns:m="http://schemas.openxmlformats.org/officeDocument/2006/math">
+                      <m:d>
+                        <m:dPr>
+                          <m:begChr m:val="{"/>
+                          <m:endChr m:val=""/>
+                          <m:ctrlPr>
+                            <a:rPr lang="it-IT" i="1" smtClean="0">
+                              <a:latin typeface="Cambria Math" panose="02040503050406030204" pitchFamily="18" charset="0"/>
+                            </a:rPr>
+                          </m:ctrlPr>
+                        </m:dPr>
+                        <m:e>
+                          <m:m>
+                            <m:mPr>
+                              <m:mcs>
+                                <m:mc>
+                                  <m:mcPr>
+                                    <m:count m:val="1"/>
+                                    <m:mcJc m:val="center"/>
+                                  </m:mcPr>
+                                </m:mc>
+                              </m:mcs>
+                              <m:ctrlPr>
+                                <a:rPr lang="it-IT" i="1" smtClean="0">
+                                  <a:latin typeface="Cambria Math" panose="02040503050406030204" pitchFamily="18" charset="0"/>
+                                </a:rPr>
+                              </m:ctrlPr>
+                            </m:mPr>
+                            <m:mr>
+                              <m:e>
+                                <m:r>
+                                  <a:rPr lang="it-IT" b="0" i="1" smtClean="0">
+                                    <a:solidFill>
+                                      <a:srgbClr val="FF0000"/>
+                                    </a:solidFill>
+                                    <a:latin typeface="Cambria Math" panose="02040503050406030204" pitchFamily="18" charset="0"/>
+                                  </a:rPr>
+                                  <m:t>𝑥</m:t>
+                                </m:r>
+                                <m:r>
+                                  <a:rPr lang="it-IT" b="0" i="1" smtClean="0">
+                                    <a:latin typeface="Cambria Math" panose="02040503050406030204" pitchFamily="18" charset="0"/>
+                                  </a:rPr>
+                                  <m:t>+</m:t>
+                                </m:r>
+                                <m:r>
+                                  <a:rPr lang="it-IT" b="0" i="1" smtClean="0">
+                                    <a:latin typeface="Cambria Math" panose="02040503050406030204" pitchFamily="18" charset="0"/>
+                                  </a:rPr>
+                                  <m:t>𝑦</m:t>
+                                </m:r>
+                                <m:r>
+                                  <a:rPr lang="it-IT" b="0" i="1" smtClean="0">
+                                    <a:latin typeface="Cambria Math" panose="02040503050406030204" pitchFamily="18" charset="0"/>
+                                  </a:rPr>
+                                  <m:t>+</m:t>
+                                </m:r>
+                                <m:r>
+                                  <a:rPr lang="it-IT" b="0" i="1" smtClean="0">
+                                    <a:latin typeface="Cambria Math" panose="02040503050406030204" pitchFamily="18" charset="0"/>
+                                  </a:rPr>
+                                  <m:t>𝑧</m:t>
+                                </m:r>
+                                <m:r>
+                                  <a:rPr lang="it-IT" b="0" i="1" smtClean="0">
+                                    <a:latin typeface="Cambria Math" panose="02040503050406030204" pitchFamily="18" charset="0"/>
+                                  </a:rPr>
+                                  <m:t>=12</m:t>
+                                </m:r>
+                              </m:e>
+                            </m:mr>
+                            <m:mr>
+                              <m:e>
+                                <m:r>
+                                  <a:rPr lang="it-IT" b="0" i="1" smtClean="0">
+                                    <a:latin typeface="Cambria Math" panose="02040503050406030204" pitchFamily="18" charset="0"/>
+                                  </a:rPr>
+                                  <m:t>𝑥</m:t>
+                                </m:r>
+                                <m:r>
+                                  <a:rPr lang="it-IT" b="0" i="1" smtClean="0">
+                                    <a:latin typeface="Cambria Math" panose="02040503050406030204" pitchFamily="18" charset="0"/>
+                                  </a:rPr>
+                                  <m:t>+2</m:t>
+                                </m:r>
+                                <m:r>
+                                  <a:rPr lang="it-IT" b="0" i="1" smtClean="0">
+                                    <a:latin typeface="Cambria Math" panose="02040503050406030204" pitchFamily="18" charset="0"/>
+                                  </a:rPr>
+                                  <m:t>𝑦</m:t>
+                                </m:r>
+                                <m:r>
+                                  <a:rPr lang="it-IT" b="0" i="1" smtClean="0">
+                                    <a:latin typeface="Cambria Math" panose="02040503050406030204" pitchFamily="18" charset="0"/>
+                                  </a:rPr>
+                                  <m:t>−</m:t>
+                                </m:r>
+                                <m:r>
+                                  <a:rPr lang="it-IT" b="0" i="1" smtClean="0">
+                                    <a:latin typeface="Cambria Math" panose="02040503050406030204" pitchFamily="18" charset="0"/>
+                                  </a:rPr>
+                                  <m:t>2</m:t>
+                                </m:r>
+                                <m:r>
+                                  <a:rPr lang="it-IT" b="0" i="1" smtClean="0">
+                                    <a:latin typeface="Cambria Math" panose="02040503050406030204" pitchFamily="18" charset="0"/>
+                                  </a:rPr>
+                                  <m:t>𝑧</m:t>
+                                </m:r>
+                                <m:r>
+                                  <a:rPr lang="it-IT" b="0" i="1" smtClean="0">
+                                    <a:latin typeface="Cambria Math" panose="02040503050406030204" pitchFamily="18" charset="0"/>
+                                  </a:rPr>
+                                  <m:t>=1</m:t>
+                                </m:r>
+                              </m:e>
+                            </m:mr>
+                            <m:mr>
+                              <m:e>
+                                <m:r>
+                                  <a:rPr lang="it-IT" b="0" i="1" smtClean="0">
+                                    <a:latin typeface="Cambria Math" panose="02040503050406030204" pitchFamily="18" charset="0"/>
+                                  </a:rPr>
+                                  <m:t>2</m:t>
+                                </m:r>
+                                <m:r>
+                                  <a:rPr lang="it-IT" b="0" i="1" smtClean="0">
+                                    <a:latin typeface="Cambria Math" panose="02040503050406030204" pitchFamily="18" charset="0"/>
+                                  </a:rPr>
+                                  <m:t>𝑥</m:t>
+                                </m:r>
+                                <m:r>
+                                  <a:rPr lang="it-IT" b="0" i="1" smtClean="0">
+                                    <a:latin typeface="Cambria Math" panose="02040503050406030204" pitchFamily="18" charset="0"/>
+                                  </a:rPr>
+                                  <m:t>+</m:t>
+                                </m:r>
+                                <m:r>
+                                  <a:rPr lang="it-IT" b="0" i="1" smtClean="0">
+                                    <a:latin typeface="Cambria Math" panose="02040503050406030204" pitchFamily="18" charset="0"/>
+                                  </a:rPr>
+                                  <m:t>𝑦</m:t>
+                                </m:r>
+                                <m:r>
+                                  <a:rPr lang="it-IT" b="0" i="1" smtClean="0">
+                                    <a:latin typeface="Cambria Math" panose="02040503050406030204" pitchFamily="18" charset="0"/>
+                                  </a:rPr>
+                                  <m:t>−3</m:t>
+                                </m:r>
+                                <m:r>
+                                  <a:rPr lang="it-IT" b="0" i="1" smtClean="0">
+                                    <a:latin typeface="Cambria Math" panose="02040503050406030204" pitchFamily="18" charset="0"/>
+                                  </a:rPr>
+                                  <m:t>𝑧</m:t>
+                                </m:r>
+                                <m:r>
+                                  <a:rPr lang="it-IT" b="0" i="1" smtClean="0">
+                                    <a:latin typeface="Cambria Math" panose="02040503050406030204" pitchFamily="18" charset="0"/>
+                                  </a:rPr>
+                                  <m:t>=−5</m:t>
+                                </m:r>
+                              </m:e>
+                            </m:mr>
+                          </m:m>
+                        </m:e>
+                      </m:d>
+                    </m:oMath>
+                  </m:oMathPara>
+                </a14:m>
+                <a:endParaRPr lang="it-IT" dirty="0"/>
+              </a:p>
+            </p:txBody>
+          </p:sp>
+        </mc:Choice>
+        <mc:Fallback>
+          <p:sp>
+            <p:nvSpPr>
+              <p:cNvPr id="14" name="CasellaDiTesto 13">
+                <a:extLst>
+                  <a:ext uri="{FF2B5EF4-FFF2-40B4-BE49-F238E27FC236}">
+                    <a16:creationId xmlns:a16="http://schemas.microsoft.com/office/drawing/2014/main" id="{CA5A7C94-49AA-4482-80DF-31971186D645}"/>
+                  </a:ext>
+                </a:extLst>
+              </p:cNvPr>
+              <p:cNvSpPr txBox="1">
+                <a:spLocks noRot="1" noChangeAspect="1" noMove="1" noResize="1" noEditPoints="1" noAdjustHandles="1" noChangeArrowheads="1" noChangeShapeType="1" noTextEdit="1"/>
+              </p:cNvSpPr>
+              <p:nvPr/>
+            </p:nvSpPr>
+            <p:spPr>
+              <a:xfrm>
+                <a:off x="1138816" y="4423888"/>
+                <a:ext cx="1981247" cy="884281"/>
+              </a:xfrm>
+              <a:prstGeom prst="rect">
+                <a:avLst/>
+              </a:prstGeom>
+              <a:blipFill>
+                <a:blip r:embed="rId4"/>
+                <a:stretch>
+                  <a:fillRect/>
+                </a:stretch>
+              </a:blipFill>
+            </p:spPr>
+            <p:txBody>
+              <a:bodyPr/>
+              <a:lstStyle/>
+              <a:p>
+                <a:r>
+                  <a:rPr lang="it-IT">
+                    <a:noFill/>
+                  </a:rPr>
+                  <a:t> </a:t>
+                </a:r>
+              </a:p>
+            </p:txBody>
+          </p:sp>
+        </mc:Fallback>
+      </mc:AlternateContent>
+      <p:cxnSp>
+        <p:nvCxnSpPr>
+          <p:cNvPr id="18" name="Connettore 2 17">
             <a:extLst>
               <a:ext uri="{FF2B5EF4-FFF2-40B4-BE49-F238E27FC236}">
-                <a16:creationId xmlns:a16="http://schemas.microsoft.com/office/drawing/2014/main" id="{317251CE-6BF7-42E9-B37B-86179E7C6251}"/>
+                <a16:creationId xmlns:a16="http://schemas.microsoft.com/office/drawing/2014/main" id="{82851849-F56B-4B98-8777-293AA5306717}"/>
               </a:ext>
             </a:extLst>
           </p:cNvPr>
-          <p:cNvSpPr txBox="1"/>
+          <p:cNvCxnSpPr>
+            <a:cxnSpLocks/>
+          </p:cNvCxnSpPr>
           <p:nvPr/>
-        </p:nvSpPr>
+        </p:nvCxnSpPr>
         <p:spPr>
           <a:xfrm>
-            <a:off x="2159253" y="4282374"/>
-            <a:ext cx="1591337" cy="369332"/>
+            <a:off x="3411152" y="4866028"/>
+            <a:ext cx="1012013" cy="0"/>
           </a:xfrm>
-          <a:prstGeom prst="rect">
+          <a:prstGeom prst="straightConnector1">
             <a:avLst/>
           </a:prstGeom>
-          <a:noFill/>
+          <a:ln>
+            <a:tailEnd type="triangle"/>
+          </a:ln>
         </p:spPr>
-        <p:txBody>
-          <a:bodyPr wrap="square" rtlCol="0">
-            <a:spAutoFit/>
-          </a:bodyPr>
-          <a:lstStyle/>
-          <a:p>
-            <a:r>
-              <a:rPr lang="it-IT" i="1" dirty="0"/>
-              <a:t>Matrice 3 x 3</a:t>
-            </a:r>
-          </a:p>
-        </p:txBody>
-      </p:sp>
-      <p:sp>
-        <p:nvSpPr>
-          <p:cNvPr id="17" name="CasellaDiTesto 16">
+        <p:style>
+          <a:lnRef idx="1">
+            <a:schemeClr val="accent1"/>
+          </a:lnRef>
+          <a:fillRef idx="0">
+            <a:schemeClr val="accent1"/>
+          </a:fillRef>
+          <a:effectRef idx="0">
+            <a:schemeClr val="accent1"/>
+          </a:effectRef>
+          <a:fontRef idx="minor">
+            <a:schemeClr val="tx1"/>
+          </a:fontRef>
+        </p:style>
+      </p:cxnSp>
+      <p:cxnSp>
+        <p:nvCxnSpPr>
+          <p:cNvPr id="19" name="Connettore 2 18">
             <a:extLst>
               <a:ext uri="{FF2B5EF4-FFF2-40B4-BE49-F238E27FC236}">
-                <a16:creationId xmlns:a16="http://schemas.microsoft.com/office/drawing/2014/main" id="{D6933B05-071A-4900-9116-6FC344E92A00}"/>
+                <a16:creationId xmlns:a16="http://schemas.microsoft.com/office/drawing/2014/main" id="{36349375-29BC-4FE0-B9F8-BAB8A9C01422}"/>
               </a:ext>
             </a:extLst>
           </p:cNvPr>
-          <p:cNvSpPr txBox="1"/>
+          <p:cNvCxnSpPr>
+            <a:cxnSpLocks/>
+          </p:cNvCxnSpPr>
           <p:nvPr/>
-        </p:nvSpPr>
+        </p:nvCxnSpPr>
         <p:spPr>
           <a:xfrm>
-            <a:off x="8441412" y="4282374"/>
-            <a:ext cx="1591337" cy="369332"/>
+            <a:off x="6852030" y="4866028"/>
+            <a:ext cx="1012013" cy="0"/>
           </a:xfrm>
-          <a:prstGeom prst="rect">
+          <a:prstGeom prst="straightConnector1">
             <a:avLst/>
           </a:prstGeom>
-          <a:noFill/>
+          <a:ln>
+            <a:tailEnd type="triangle"/>
+          </a:ln>
         </p:spPr>
-        <p:txBody>
-          <a:bodyPr wrap="square" rtlCol="0">
-            <a:spAutoFit/>
-          </a:bodyPr>
-          <a:lstStyle/>
-          <a:p>
-            <a:r>
-              <a:rPr lang="it-IT" i="1" dirty="0"/>
-              <a:t>Matrice 3 x 4</a:t>
-            </a:r>
-          </a:p>
-        </p:txBody>
-      </p:sp>
+        <p:style>
+          <a:lnRef idx="1">
+            <a:schemeClr val="accent1"/>
+          </a:lnRef>
+          <a:fillRef idx="0">
+            <a:schemeClr val="accent1"/>
+          </a:fillRef>
+          <a:effectRef idx="0">
+            <a:schemeClr val="accent1"/>
+          </a:effectRef>
+          <a:fontRef idx="minor">
+            <a:schemeClr val="tx1"/>
+          </a:fontRef>
+        </p:style>
+      </p:cxnSp>
     </p:spTree>
     <p:extLst>
       <p:ext uri="{BB962C8B-B14F-4D97-AF65-F5344CB8AC3E}">
@@ -6168,7 +6673,7 @@
 </p:sld>
 </file>
 
-<file path=ppt/slides/slide12.xml><?xml version="1.0" encoding="utf-8"?>
+<file path=ppt/slides/slide13.xml><?xml version="1.0" encoding="utf-8"?>
 <p:sld xmlns:a="http://schemas.openxmlformats.org/drawingml/2006/main" xmlns:r="http://schemas.openxmlformats.org/officeDocument/2006/relationships" xmlns:p="http://schemas.openxmlformats.org/presentationml/2006/main">
   <p:cSld>
     <p:spTree>
@@ -6291,7 +6796,7 @@
 </p:sld>
 </file>
 
-<file path=ppt/slides/slide13.xml><?xml version="1.0" encoding="utf-8"?>
+<file path=ppt/slides/slide14.xml><?xml version="1.0" encoding="utf-8"?>
 <p:sld xmlns:a="http://schemas.openxmlformats.org/drawingml/2006/main" xmlns:r="http://schemas.openxmlformats.org/officeDocument/2006/relationships" xmlns:p="http://schemas.openxmlformats.org/presentationml/2006/main">
   <p:cSld>
     <p:spTree>
@@ -8181,8 +8686,8 @@
           </a:p>
         </p:txBody>
       </p:sp>
-      <mc:AlternateContent xmlns:mc="http://schemas.openxmlformats.org/markup-compatibility/2006">
-        <mc:Choice xmlns:a14="http://schemas.microsoft.com/office/drawing/2010/main" Requires="a14">
+      <mc:AlternateContent xmlns:mc="http://schemas.openxmlformats.org/markup-compatibility/2006" xmlns:a14="http://schemas.microsoft.com/office/drawing/2010/main">
+        <mc:Choice Requires="a14">
           <p:sp>
             <p:nvSpPr>
               <p:cNvPr id="11" name="CasellaDiTesto 10">
@@ -8536,7 +9041,7 @@
             </p:txBody>
           </p:sp>
         </mc:Choice>
-        <mc:Fallback>
+        <mc:Fallback xmlns="">
           <p:sp>
             <p:nvSpPr>
               <p:cNvPr id="11" name="CasellaDiTesto 10">
@@ -9010,8 +9515,8 @@
         </p:nvSpPr>
         <p:spPr>
           <a:xfrm>
-            <a:off x="681925" y="1690688"/>
-            <a:ext cx="9593451" cy="1477328"/>
+            <a:off x="697423" y="1287433"/>
+            <a:ext cx="10848814" cy="2215991"/>
           </a:xfrm>
           <a:prstGeom prst="rect">
             <a:avLst/>
@@ -9043,6 +9548,38 @@
             <a:r>
               <a:rPr lang="it-IT" sz="2400" dirty="0"/>
               <a:t>i cui elementi sono i coefficienti e i termini noti del sistema.</a:t>
+            </a:r>
+          </a:p>
+          <a:p>
+            <a:r>
+              <a:rPr lang="it-IT" sz="2400" dirty="0"/>
+              <a:t>Questa è detta </a:t>
+            </a:r>
+            <a:r>
+              <a:rPr lang="it-IT" sz="2400" b="1" dirty="0">
+                <a:solidFill>
+                  <a:srgbClr val="FF0000"/>
+                </a:solidFill>
+              </a:rPr>
+              <a:t>MATRICE COMPLETA</a:t>
+            </a:r>
+            <a:r>
+              <a:rPr lang="it-IT" sz="2400" dirty="0"/>
+              <a:t>. </a:t>
+            </a:r>
+          </a:p>
+          <a:p>
+            <a:r>
+              <a:rPr lang="it-IT" sz="2400" dirty="0"/>
+              <a:t>I </a:t>
+            </a:r>
+            <a:r>
+              <a:rPr lang="it-IT" sz="2400" b="1" u="sng" dirty="0"/>
+              <a:t>coefficienti devono essere ordinati</a:t>
+            </a:r>
+            <a:r>
+              <a:rPr lang="it-IT" sz="2400" dirty="0"/>
+              <a:t>. Guarda i colori per comprendere il posizionamento dei numeri. </a:t>
             </a:r>
           </a:p>
           <a:p>
@@ -9064,7 +9601,7 @@
         </p:nvGrpSpPr>
         <p:grpSpPr>
           <a:xfrm>
-            <a:off x="2157840" y="3227051"/>
+            <a:off x="2141925" y="3316544"/>
             <a:ext cx="7334117" cy="925867"/>
             <a:chOff x="1828608" y="2614018"/>
             <a:chExt cx="7334117" cy="925867"/>
@@ -10062,8 +10599,8 @@
         </p:nvSpPr>
         <p:spPr>
           <a:xfrm>
-            <a:off x="9581240" y="194443"/>
-            <a:ext cx="2367953" cy="1563713"/>
+            <a:off x="9722485" y="0"/>
+            <a:ext cx="2367953" cy="1325563"/>
           </a:xfrm>
           <a:prstGeom prst="foldedCorner">
             <a:avLst/>
@@ -11090,8 +11627,8 @@
         </p:nvSpPr>
         <p:spPr>
           <a:xfrm>
-            <a:off x="9177107" y="4326644"/>
-            <a:ext cx="2688984" cy="2384796"/>
+            <a:off x="9428535" y="4141336"/>
+            <a:ext cx="2688984" cy="1965727"/>
           </a:xfrm>
           <a:prstGeom prst="foldedCorner">
             <a:avLst/>
@@ -11125,7 +11662,7 @@
           <a:p>
             <a:r>
               <a:rPr lang="it-IT" dirty="0"/>
-              <a:t>I coefficienti devono essere ordinati. Se nel sistema non compare un’incognita, nella matrice al posto corrispondente bisogna inserire uno 0</a:t>
+              <a:t>Se nel sistema non compare un’incognita, nella matrice al posto corrispondente bisogna inserire uno 0.</a:t>
             </a:r>
           </a:p>
         </p:txBody>
@@ -11297,7 +11834,7 @@
             </a:pPr>
             <a:r>
               <a:rPr lang="it-IT" dirty="0"/>
-              <a:t>Una matrice è una tabella ordinata di elementi disposti su n righe e m colonne.</a:t>
+              <a:t>Una matrice è una tabella ordinata di elementi disposti su n righe e m colonne. </a:t>
             </a:r>
           </a:p>
         </p:txBody>
@@ -11396,6 +11933,40 @@
           </a:prstGeom>
         </p:spPr>
       </p:pic>
+      <p:sp>
+        <p:nvSpPr>
+          <p:cNvPr id="2" name="Rettangolo 1">
+            <a:extLst>
+              <a:ext uri="{FF2B5EF4-FFF2-40B4-BE49-F238E27FC236}">
+                <a16:creationId xmlns:a16="http://schemas.microsoft.com/office/drawing/2014/main" id="{BC664FA9-B8CE-4002-BF6B-F3B113C0A972}"/>
+              </a:ext>
+            </a:extLst>
+          </p:cNvPr>
+          <p:cNvSpPr/>
+          <p:nvPr/>
+        </p:nvSpPr>
+        <p:spPr>
+          <a:xfrm>
+            <a:off x="1150114" y="5615575"/>
+            <a:ext cx="7947391" cy="369332"/>
+          </a:xfrm>
+          <a:prstGeom prst="rect">
+            <a:avLst/>
+          </a:prstGeom>
+        </p:spPr>
+        <p:txBody>
+          <a:bodyPr wrap="square">
+            <a:spAutoFit/>
+          </a:bodyPr>
+          <a:lstStyle/>
+          <a:p>
+            <a:r>
+              <a:rPr lang="it-IT" dirty="0"/>
+              <a:t>Al suo interno possono comparire numeri positivi, negativi o anche zeri. </a:t>
+            </a:r>
+          </a:p>
+        </p:txBody>
+      </p:sp>
     </p:spTree>
     <p:extLst>
       <p:ext uri="{BB962C8B-B14F-4D97-AF65-F5344CB8AC3E}">

</xml_diff>